<commit_message>
Updated the tSQLt Tests definition
</commit_message>
<xml_diff>
--- a/tSQLt_Introduction/Presentation/tSQLt_Introduction.pptx
+++ b/tSQLt_Introduction/Presentation/tSQLt_Introduction.pptx
@@ -13966,7 +13966,7 @@
           <a:p>
             <a:fld id="{E4C3FCC2-4E7A-4671-AA79-177CB194E449}" type="datetimeFigureOut">
               <a:rPr lang="en-US" smtClean="0"/>
-              <a:t>06/01//2020</a:t>
+              <a:t>09/01//2020</a:t>
             </a:fld>
             <a:endParaRPr lang="en-US"/>
           </a:p>
@@ -16117,7 +16117,7 @@
           <a:p>
             <a:fld id="{4744E560-77BF-4D1A-B6E7-CD55CE12B1B8}" type="datetimeFigureOut">
               <a:rPr lang="en-US" smtClean="0"/>
-              <a:t>06/01//2020</a:t>
+              <a:t>09/01//2020</a:t>
             </a:fld>
             <a:endParaRPr lang="en-US"/>
           </a:p>
@@ -16634,8 +16634,8 @@
         </p:nvSpPr>
         <p:spPr>
           <a:xfrm>
-            <a:off x="800307" y="5172148"/>
-            <a:ext cx="8006835" cy="842683"/>
+            <a:off x="585154" y="4667640"/>
+            <a:ext cx="2857293" cy="484581"/>
           </a:xfrm>
         </p:spPr>
         <p:txBody>
@@ -16643,29 +16643,22 @@
           <a:lstStyle/>
           <a:p>
             <a:r>
-              <a:rPr lang="en-US" sz="2600" b="1" dirty="0"/>
+              <a:rPr lang="en-US" sz="2800" b="1" dirty="0"/>
               <a:t>Roman </a:t>
             </a:r>
             <a:r>
-              <a:rPr lang="en-US" sz="2600" b="1" dirty="0" err="1"/>
+              <a:rPr lang="en-US" sz="2800" b="1" dirty="0" err="1"/>
               <a:t>Pij</a:t>
             </a:r>
             <a:r>
-              <a:rPr lang="cs-CZ" sz="2600" b="1" dirty="0"/>
+              <a:rPr lang="cs-CZ" sz="2800" b="1" dirty="0"/>
               <a:t>áč</a:t>
             </a:r>
             <a:r>
-              <a:rPr lang="en-US" sz="2600" b="1" dirty="0" err="1"/>
+              <a:rPr lang="en-US" sz="2800" b="1" dirty="0" err="1"/>
               <a:t>ek</a:t>
             </a:r>
-            <a:endParaRPr lang="cs-CZ" sz="2600" b="1" dirty="0"/>
-          </a:p>
-          <a:p>
-            <a:r>
-              <a:rPr lang="cs-CZ" dirty="0"/>
-              <a:t>MS BI Dev @ Joyful Craftsmen s.r.o.</a:t>
-            </a:r>
-            <a:endParaRPr lang="en-US" dirty="0"/>
+            <a:endParaRPr lang="cs-CZ" sz="2800" b="1" dirty="0"/>
           </a:p>
         </p:txBody>
       </p:sp>
@@ -16731,6 +16724,42 @@
           </a:extLst>
         </p:spPr>
       </p:pic>
+      <p:pic>
+        <p:nvPicPr>
+          <p:cNvPr id="5" name="Picture 4">
+            <a:extLst>
+              <a:ext uri="{FF2B5EF4-FFF2-40B4-BE49-F238E27FC236}">
+                <a16:creationId xmlns:a16="http://schemas.microsoft.com/office/drawing/2014/main" id="{3856A38C-51E8-4B31-82CF-8ACC78FB66BA}"/>
+              </a:ext>
+            </a:extLst>
+          </p:cNvPr>
+          <p:cNvPicPr>
+            <a:picLocks noChangeAspect="1"/>
+          </p:cNvPicPr>
+          <p:nvPr/>
+        </p:nvPicPr>
+        <p:blipFill>
+          <a:blip r:embed="rId3">
+            <a:extLst>
+              <a:ext uri="{28A0092B-C50C-407E-A947-70E740481C1C}">
+                <a14:useLocalDpi xmlns:a14="http://schemas.microsoft.com/office/drawing/2010/main" val="0"/>
+              </a:ext>
+            </a:extLst>
+          </a:blip>
+          <a:stretch>
+            <a:fillRect/>
+          </a:stretch>
+        </p:blipFill>
+        <p:spPr>
+          <a:xfrm>
+            <a:off x="585154" y="5299398"/>
+            <a:ext cx="3480626" cy="849272"/>
+          </a:xfrm>
+          <a:prstGeom prst="rect">
+            <a:avLst/>
+          </a:prstGeom>
+        </p:spPr>
+      </p:pic>
     </p:spTree>
     <p:extLst>
       <p:ext uri="{BB962C8B-B14F-4D97-AF65-F5344CB8AC3E}">
@@ -16757,7 +16786,7 @@
 </file>
 
 <file path=ppt/slides/slide2.xml><?xml version="1.0" encoding="utf-8"?>
-<p:sld xmlns:a="http://schemas.openxmlformats.org/drawingml/2006/main" xmlns:r="http://schemas.openxmlformats.org/officeDocument/2006/relationships" xmlns:p="http://schemas.openxmlformats.org/presentationml/2006/main">
+<p:sld xmlns:a="http://schemas.openxmlformats.org/drawingml/2006/main" xmlns:r="http://schemas.openxmlformats.org/officeDocument/2006/relationships" xmlns:p="http://schemas.openxmlformats.org/presentationml/2006/main" show="0">
   <p:cSld>
     <p:spTree>
       <p:nvGrpSpPr>
@@ -17282,13 +17311,13 @@
   <p:clrMapOvr>
     <a:masterClrMapping/>
   </p:clrMapOvr>
-  <mc:AlternateContent xmlns:mc="http://schemas.openxmlformats.org/markup-compatibility/2006" xmlns:p14="http://schemas.microsoft.com/office/powerpoint/2010/main">
-    <mc:Choice Requires="p14">
+  <mc:AlternateContent xmlns:mc="http://schemas.openxmlformats.org/markup-compatibility/2006">
+    <mc:Choice xmlns:p14="http://schemas.microsoft.com/office/powerpoint/2010/main" Requires="p14">
       <p:transition spd="med" p14:dur="700">
         <p:fade/>
       </p:transition>
     </mc:Choice>
-    <mc:Fallback xmlns="">
+    <mc:Fallback>
       <p:transition spd="med">
         <p:fade/>
       </p:transition>
@@ -17353,7 +17382,7 @@
             </a:r>
             <a:r>
               <a:rPr lang="en-US" sz="2400" dirty="0"/>
-              <a:t>Database unit testing framework for </a:t>
+              <a:t>Database Unit Testing framework for </a:t>
             </a:r>
             <a:r>
               <a:rPr lang="cs-CZ" sz="2400" dirty="0"/>
@@ -17385,7 +17414,7 @@
             </a:r>
             <a:r>
               <a:rPr lang="en-US" sz="2400" dirty="0"/>
-              <a:t> with all editions of SQL Server from the 2005 S</a:t>
+              <a:t> with SQL Server 2005 S</a:t>
             </a:r>
             <a:r>
               <a:rPr lang="cs-CZ" sz="2400" dirty="0"/>
@@ -17413,7 +17442,15 @@
             </a:pPr>
             <a:r>
               <a:rPr lang="en-US" sz="2400" dirty="0"/>
-              <a:t>      Unit tests, and asserts, written in T-SQL</a:t>
+              <a:t>      </a:t>
+            </a:r>
+            <a:r>
+              <a:rPr lang="en-US" sz="2400" dirty="0" err="1"/>
+              <a:t>tSQLt</a:t>
+            </a:r>
+            <a:r>
+              <a:rPr lang="en-US" sz="2400" dirty="0"/>
+              <a:t> frameworks written in T-SQL and C#</a:t>
             </a:r>
           </a:p>
           <a:p>
@@ -17425,7 +17462,7 @@
             </a:pPr>
             <a:r>
               <a:rPr lang="en-US" sz="2400" dirty="0"/>
-              <a:t>      Tests are run within transactions</a:t>
+              <a:t>      Test Classes, Unit Tests, Asserts written in T-SQL</a:t>
             </a:r>
           </a:p>
           <a:p>
@@ -17437,7 +17474,15 @@
             </a:pPr>
             <a:r>
               <a:rPr lang="en-US" sz="2400" dirty="0"/>
-              <a:t>      Tests are grouped within schemas</a:t>
+              <a:t>      Tests categorized into </a:t>
+            </a:r>
+            <a:r>
+              <a:rPr lang="en-US" sz="2400" dirty="0" err="1"/>
+              <a:t>TestClasses</a:t>
+            </a:r>
+            <a:r>
+              <a:rPr lang="en-US" sz="2400" dirty="0"/>
+              <a:t>, executed within transactions</a:t>
             </a:r>
           </a:p>
           <a:p>
@@ -17551,7 +17596,7 @@
         </p:blipFill>
         <p:spPr bwMode="auto">
           <a:xfrm>
-            <a:off x="10013576" y="3937438"/>
+            <a:off x="10219764" y="4000191"/>
             <a:ext cx="1583579" cy="1985894"/>
           </a:xfrm>
           <a:prstGeom prst="round2DiagRect">
@@ -21946,6 +21991,23 @@
 </file>
 
 <file path=customXml/item1.xml><?xml version="1.0" encoding="utf-8"?>
+<?mso-contentType ?>
+<FormTemplates xmlns="http://schemas.microsoft.com/sharepoint/v3/contenttype/forms">
+  <Display>DocumentLibraryForm</Display>
+  <Edit>DocumentLibraryForm</Edit>
+  <New>DocumentLibraryForm</New>
+</FormTemplates>
+</file>
+
+<file path=customXml/item2.xml><?xml version="1.0" encoding="utf-8"?>
+<p:properties xmlns:p="http://schemas.microsoft.com/office/2006/metadata/properties" xmlns:xsi="http://www.w3.org/2001/XMLSchema-instance" xmlns:pc="http://schemas.microsoft.com/office/infopath/2007/PartnerControls">
+  <documentManagement>
+    <MediaServiceKeyPoints xmlns="71af3243-3dd4-4a8d-8c0d-dd76da1f02a5" xsi:nil="true"/>
+  </documentManagement>
+</p:properties>
+</file>
+
+<file path=customXml/item3.xml><?xml version="1.0" encoding="utf-8"?>
 <ct:contentTypeSchema xmlns:ct="http://schemas.microsoft.com/office/2006/metadata/contentType" xmlns:ma="http://schemas.microsoft.com/office/2006/metadata/properties/metaAttributes" ct:_="" ma:_="" ma:contentTypeName="Document" ma:contentTypeID="0x01010079F111ED35F8CC479449609E8A0923A6" ma:contentTypeVersion="11" ma:contentTypeDescription="Create a new document." ma:contentTypeScope="" ma:versionID="dc7352e55e77714fab0739bd1a2ce122">
   <xsd:schema xmlns:xsd="http://www.w3.org/2001/XMLSchema" xmlns:xs="http://www.w3.org/2001/XMLSchema" xmlns:p="http://schemas.microsoft.com/office/2006/metadata/properties" xmlns:ns2="71af3243-3dd4-4a8d-8c0d-dd76da1f02a5" xmlns:ns3="16c05727-aa75-4e4a-9b5f-8a80a1165891" targetNamespace="http://schemas.microsoft.com/office/2006/metadata/properties" ma:root="true" ma:fieldsID="b47b806cf7e90fe7257fa1ff83c741bf" ns2:_="" ns3:_="">
     <xsd:import namespace="71af3243-3dd4-4a8d-8c0d-dd76da1f02a5"/>
@@ -22156,24 +22218,25 @@
 </ct:contentTypeSchema>
 </file>
 
-<file path=customXml/item2.xml><?xml version="1.0" encoding="utf-8"?>
-<p:properties xmlns:p="http://schemas.microsoft.com/office/2006/metadata/properties" xmlns:xsi="http://www.w3.org/2001/XMLSchema-instance" xmlns:pc="http://schemas.microsoft.com/office/infopath/2007/PartnerControls">
-  <documentManagement>
-    <MediaServiceKeyPoints xmlns="71af3243-3dd4-4a8d-8c0d-dd76da1f02a5" xsi:nil="true"/>
-  </documentManagement>
-</p:properties>
+<file path=customXml/itemProps1.xml><?xml version="1.0" encoding="utf-8"?>
+<ds:datastoreItem xmlns:ds="http://schemas.openxmlformats.org/officeDocument/2006/customXml" ds:itemID="{4F65ABD0-66F0-4867-AB0F-1D49B233B616}">
+  <ds:schemaRefs>
+    <ds:schemaRef ds:uri="http://schemas.microsoft.com/sharepoint/v3/contenttype/forms"/>
+  </ds:schemaRefs>
+</ds:datastoreItem>
 </file>
 
-<file path=customXml/item3.xml><?xml version="1.0" encoding="utf-8"?>
-<?mso-contentType ?>
-<FormTemplates xmlns="http://schemas.microsoft.com/sharepoint/v3/contenttype/forms">
-  <Display>DocumentLibraryForm</Display>
-  <Edit>DocumentLibraryForm</Edit>
-  <New>DocumentLibraryForm</New>
-</FormTemplates>
+<file path=customXml/itemProps2.xml><?xml version="1.0" encoding="utf-8"?>
+<ds:datastoreItem xmlns:ds="http://schemas.openxmlformats.org/officeDocument/2006/customXml" ds:itemID="{34E1C146-B5CC-434F-9800-0CC81875367E}">
+  <ds:schemaRefs>
+    <ds:schemaRef ds:uri="http://schemas.microsoft.com/office/2006/metadata/properties"/>
+    <ds:schemaRef ds:uri="http://schemas.microsoft.com/office/infopath/2007/PartnerControls"/>
+    <ds:schemaRef ds:uri="71af3243-3dd4-4a8d-8c0d-dd76da1f02a5"/>
+  </ds:schemaRefs>
+</ds:datastoreItem>
 </file>
 
-<file path=customXml/itemProps1.xml><?xml version="1.0" encoding="utf-8"?>
+<file path=customXml/itemProps3.xml><?xml version="1.0" encoding="utf-8"?>
 <ds:datastoreItem xmlns:ds="http://schemas.openxmlformats.org/officeDocument/2006/customXml" ds:itemID="{6C541ACD-2E23-424D-AA73-C02742EA4702}">
   <ds:schemaRefs>
     <ds:schemaRef ds:uri="http://schemas.microsoft.com/office/2006/metadata/contentType"/>
@@ -22190,22 +22253,4 @@
     <ds:schemaRef ds:uri="http://schemas.microsoft.com/internal/obd"/>
   </ds:schemaRefs>
 </ds:datastoreItem>
-</file>
-
-<file path=customXml/itemProps2.xml><?xml version="1.0" encoding="utf-8"?>
-<ds:datastoreItem xmlns:ds="http://schemas.openxmlformats.org/officeDocument/2006/customXml" ds:itemID="{34E1C146-B5CC-434F-9800-0CC81875367E}">
-  <ds:schemaRefs>
-    <ds:schemaRef ds:uri="http://schemas.microsoft.com/office/2006/metadata/properties"/>
-    <ds:schemaRef ds:uri="http://schemas.microsoft.com/office/infopath/2007/PartnerControls"/>
-    <ds:schemaRef ds:uri="71af3243-3dd4-4a8d-8c0d-dd76da1f02a5"/>
-  </ds:schemaRefs>
-</ds:datastoreItem>
-</file>
-
-<file path=customXml/itemProps3.xml><?xml version="1.0" encoding="utf-8"?>
-<ds:datastoreItem xmlns:ds="http://schemas.openxmlformats.org/officeDocument/2006/customXml" ds:itemID="{4F65ABD0-66F0-4867-AB0F-1D49B233B616}">
-  <ds:schemaRefs>
-    <ds:schemaRef ds:uri="http://schemas.microsoft.com/sharepoint/v3/contenttype/forms"/>
-  </ds:schemaRefs>
-</ds:datastoreItem>
 </file>
</xml_diff>

<commit_message>
Adding AdventureWorks2017 backup file
</commit_message>
<xml_diff>
--- a/tSQLt_Introduction/Presentation/tSQLt_Introduction.pptx
+++ b/tSQLt_Introduction/Presentation/tSQLt_Introduction.pptx
@@ -13966,7 +13966,7 @@
           <a:p>
             <a:fld id="{E4C3FCC2-4E7A-4671-AA79-177CB194E449}" type="datetimeFigureOut">
               <a:rPr lang="en-US" smtClean="0"/>
-              <a:t>12/01//2020</a:t>
+              <a:t>13/01//2020</a:t>
             </a:fld>
             <a:endParaRPr lang="en-US"/>
           </a:p>
@@ -16117,7 +16117,7 @@
           <a:p>
             <a:fld id="{4744E560-77BF-4D1A-B6E7-CD55CE12B1B8}" type="datetimeFigureOut">
               <a:rPr lang="en-US" smtClean="0"/>
-              <a:t>12/01//2020</a:t>
+              <a:t>13/01//2020</a:t>
             </a:fld>
             <a:endParaRPr lang="en-US"/>
           </a:p>

</xml_diff>